<commit_message>
Updated Trial Tracker and IMU Data, still in progress
</commit_message>
<xml_diff>
--- a/AlexDubois/SystemFlowChartAsProgress.pptx
+++ b/AlexDubois/SystemFlowChartAsProgress.pptx
@@ -245,7 +245,7 @@
           <a:p>
             <a:fld id="{6126B1B9-2C42-4F2D-85A1-61B6C1EC9C7B}" type="datetimeFigureOut">
               <a:rPr lang="en-US" smtClean="0"/>
-              <a:t>10/30/2016</a:t>
+              <a:t>11/13/2016</a:t>
             </a:fld>
             <a:endParaRPr lang="en-US"/>
           </a:p>
@@ -415,7 +415,7 @@
           <a:p>
             <a:fld id="{6126B1B9-2C42-4F2D-85A1-61B6C1EC9C7B}" type="datetimeFigureOut">
               <a:rPr lang="en-US" smtClean="0"/>
-              <a:t>10/30/2016</a:t>
+              <a:t>11/13/2016</a:t>
             </a:fld>
             <a:endParaRPr lang="en-US"/>
           </a:p>
@@ -595,7 +595,7 @@
           <a:p>
             <a:fld id="{6126B1B9-2C42-4F2D-85A1-61B6C1EC9C7B}" type="datetimeFigureOut">
               <a:rPr lang="en-US" smtClean="0"/>
-              <a:t>10/30/2016</a:t>
+              <a:t>11/13/2016</a:t>
             </a:fld>
             <a:endParaRPr lang="en-US"/>
           </a:p>
@@ -765,7 +765,7 @@
           <a:p>
             <a:fld id="{6126B1B9-2C42-4F2D-85A1-61B6C1EC9C7B}" type="datetimeFigureOut">
               <a:rPr lang="en-US" smtClean="0"/>
-              <a:t>10/30/2016</a:t>
+              <a:t>11/13/2016</a:t>
             </a:fld>
             <a:endParaRPr lang="en-US"/>
           </a:p>
@@ -1011,7 +1011,7 @@
           <a:p>
             <a:fld id="{6126B1B9-2C42-4F2D-85A1-61B6C1EC9C7B}" type="datetimeFigureOut">
               <a:rPr lang="en-US" smtClean="0"/>
-              <a:t>10/30/2016</a:t>
+              <a:t>11/13/2016</a:t>
             </a:fld>
             <a:endParaRPr lang="en-US"/>
           </a:p>
@@ -1243,7 +1243,7 @@
           <a:p>
             <a:fld id="{6126B1B9-2C42-4F2D-85A1-61B6C1EC9C7B}" type="datetimeFigureOut">
               <a:rPr lang="en-US" smtClean="0"/>
-              <a:t>10/30/2016</a:t>
+              <a:t>11/13/2016</a:t>
             </a:fld>
             <a:endParaRPr lang="en-US"/>
           </a:p>
@@ -1610,7 +1610,7 @@
           <a:p>
             <a:fld id="{6126B1B9-2C42-4F2D-85A1-61B6C1EC9C7B}" type="datetimeFigureOut">
               <a:rPr lang="en-US" smtClean="0"/>
-              <a:t>10/30/2016</a:t>
+              <a:t>11/13/2016</a:t>
             </a:fld>
             <a:endParaRPr lang="en-US"/>
           </a:p>
@@ -1728,7 +1728,7 @@
           <a:p>
             <a:fld id="{6126B1B9-2C42-4F2D-85A1-61B6C1EC9C7B}" type="datetimeFigureOut">
               <a:rPr lang="en-US" smtClean="0"/>
-              <a:t>10/30/2016</a:t>
+              <a:t>11/13/2016</a:t>
             </a:fld>
             <a:endParaRPr lang="en-US"/>
           </a:p>
@@ -1823,7 +1823,7 @@
           <a:p>
             <a:fld id="{6126B1B9-2C42-4F2D-85A1-61B6C1EC9C7B}" type="datetimeFigureOut">
               <a:rPr lang="en-US" smtClean="0"/>
-              <a:t>10/30/2016</a:t>
+              <a:t>11/13/2016</a:t>
             </a:fld>
             <a:endParaRPr lang="en-US"/>
           </a:p>
@@ -2100,7 +2100,7 @@
           <a:p>
             <a:fld id="{6126B1B9-2C42-4F2D-85A1-61B6C1EC9C7B}" type="datetimeFigureOut">
               <a:rPr lang="en-US" smtClean="0"/>
-              <a:t>10/30/2016</a:t>
+              <a:t>11/13/2016</a:t>
             </a:fld>
             <a:endParaRPr lang="en-US"/>
           </a:p>
@@ -2353,7 +2353,7 @@
           <a:p>
             <a:fld id="{6126B1B9-2C42-4F2D-85A1-61B6C1EC9C7B}" type="datetimeFigureOut">
               <a:rPr lang="en-US" smtClean="0"/>
-              <a:t>10/30/2016</a:t>
+              <a:t>11/13/2016</a:t>
             </a:fld>
             <a:endParaRPr lang="en-US"/>
           </a:p>
@@ -2566,7 +2566,7 @@
           <a:p>
             <a:fld id="{6126B1B9-2C42-4F2D-85A1-61B6C1EC9C7B}" type="datetimeFigureOut">
               <a:rPr lang="en-US" smtClean="0"/>
-              <a:t>10/30/2016</a:t>
+              <a:t>11/13/2016</a:t>
             </a:fld>
             <a:endParaRPr lang="en-US"/>
           </a:p>
@@ -3144,11 +3144,15 @@
             <a:avLst/>
           </a:prstGeom>
           <a:solidFill>
-            <a:schemeClr val="tx1">
+            <a:schemeClr val="accent6">
               <a:lumMod val="50000"/>
-              <a:lumOff val="50000"/>
             </a:schemeClr>
           </a:solidFill>
+          <a:ln>
+            <a:solidFill>
+              <a:schemeClr val="tx1"/>
+            </a:solidFill>
+          </a:ln>
         </p:spPr>
         <p:style>
           <a:lnRef idx="2">
@@ -3172,10 +3176,18 @@
           <a:p>
             <a:pPr algn="ctr"/>
             <a:r>
-              <a:rPr lang="en-US" sz="3200" dirty="0" smtClean="0"/>
+              <a:rPr lang="en-US" sz="3200" dirty="0" smtClean="0">
+                <a:solidFill>
+                  <a:schemeClr val="bg1"/>
+                </a:solidFill>
+              </a:rPr>
               <a:t>Feedback Display</a:t>
             </a:r>
-            <a:endParaRPr lang="en-US" sz="3200" dirty="0"/>
+            <a:endParaRPr lang="en-US" sz="3200" dirty="0">
+              <a:solidFill>
+                <a:schemeClr val="bg1"/>
+              </a:solidFill>
+            </a:endParaRPr>
           </a:p>
         </p:txBody>
       </p:sp>
@@ -3193,6 +3205,14 @@
           <a:prstGeom prst="rect">
             <a:avLst/>
           </a:prstGeom>
+          <a:solidFill>
+            <a:srgbClr val="FF0000"/>
+          </a:solidFill>
+          <a:ln>
+            <a:solidFill>
+              <a:schemeClr val="tx1"/>
+            </a:solidFill>
+          </a:ln>
         </p:spPr>
         <p:style>
           <a:lnRef idx="2">
@@ -3216,10 +3236,18 @@
           <a:p>
             <a:pPr algn="ctr"/>
             <a:r>
-              <a:rPr lang="en-US" sz="3200" dirty="0" smtClean="0"/>
+              <a:rPr lang="en-US" sz="3200" dirty="0" smtClean="0">
+                <a:solidFill>
+                  <a:schemeClr val="tx1"/>
+                </a:solidFill>
+              </a:rPr>
               <a:t>Signal Correction</a:t>
             </a:r>
-            <a:endParaRPr lang="en-US" sz="3200" dirty="0"/>
+            <a:endParaRPr lang="en-US" sz="3200" dirty="0">
+              <a:solidFill>
+                <a:schemeClr val="tx1"/>
+              </a:solidFill>
+            </a:endParaRPr>
           </a:p>
         </p:txBody>
       </p:sp>
@@ -3237,6 +3265,9 @@
           <a:prstGeom prst="rect">
             <a:avLst/>
           </a:prstGeom>
+          <a:solidFill>
+            <a:srgbClr val="FFC000"/>
+          </a:solidFill>
         </p:spPr>
         <p:style>
           <a:lnRef idx="2">
@@ -3260,10 +3291,30 @@
           <a:p>
             <a:pPr algn="ctr"/>
             <a:r>
+              <a:rPr lang="en-US" sz="3200" dirty="0" smtClean="0">
+                <a:solidFill>
+                  <a:schemeClr val="tx1"/>
+                </a:solidFill>
+              </a:rPr>
+              <a:t>System</a:t>
+            </a:r>
+            <a:r>
               <a:rPr lang="en-US" sz="3200" dirty="0" smtClean="0"/>
-              <a:t>System Control</a:t>
-            </a:r>
-            <a:endParaRPr lang="en-US" sz="3200" dirty="0"/>
+              <a:t> </a:t>
+            </a:r>
+            <a:r>
+              <a:rPr lang="en-US" sz="3200" dirty="0" smtClean="0">
+                <a:solidFill>
+                  <a:schemeClr val="tx1"/>
+                </a:solidFill>
+              </a:rPr>
+              <a:t>Control</a:t>
+            </a:r>
+            <a:endParaRPr lang="en-US" sz="3200" dirty="0">
+              <a:solidFill>
+                <a:schemeClr val="tx1"/>
+              </a:solidFill>
+            </a:endParaRPr>
           </a:p>
         </p:txBody>
       </p:sp>
@@ -3281,6 +3332,11 @@
           <a:prstGeom prst="rect">
             <a:avLst/>
           </a:prstGeom>
+          <a:solidFill>
+            <a:schemeClr val="accent6">
+              <a:lumMod val="50000"/>
+            </a:schemeClr>
+          </a:solidFill>
         </p:spPr>
         <p:style>
           <a:lnRef idx="2">
@@ -3304,10 +3360,18 @@
           <a:p>
             <a:pPr algn="ctr"/>
             <a:r>
-              <a:rPr lang="en-US" sz="3200" dirty="0" smtClean="0"/>
+              <a:rPr lang="en-US" sz="3200" dirty="0" smtClean="0">
+                <a:solidFill>
+                  <a:schemeClr val="bg1"/>
+                </a:solidFill>
+              </a:rPr>
               <a:t>Data Analysis</a:t>
             </a:r>
-            <a:endParaRPr lang="en-US" sz="3200" dirty="0"/>
+            <a:endParaRPr lang="en-US" sz="3200" dirty="0">
+              <a:solidFill>
+                <a:schemeClr val="bg1"/>
+              </a:solidFill>
+            </a:endParaRPr>
           </a:p>
         </p:txBody>
       </p:sp>
@@ -3326,10 +3390,7 @@
             <a:avLst/>
           </a:prstGeom>
           <a:solidFill>
-            <a:schemeClr val="tx1">
-              <a:lumMod val="50000"/>
-              <a:lumOff val="50000"/>
-            </a:schemeClr>
+            <a:srgbClr val="FFC000"/>
           </a:solidFill>
         </p:spPr>
         <p:style>
@@ -3354,10 +3415,18 @@
           <a:p>
             <a:pPr algn="ctr"/>
             <a:r>
-              <a:rPr lang="en-US" sz="3200" dirty="0" smtClean="0"/>
+              <a:rPr lang="en-US" sz="3200" dirty="0" smtClean="0">
+                <a:solidFill>
+                  <a:schemeClr val="tx1"/>
+                </a:solidFill>
+              </a:rPr>
               <a:t>Data Display Interface</a:t>
             </a:r>
-            <a:endParaRPr lang="en-US" sz="3200" dirty="0"/>
+            <a:endParaRPr lang="en-US" sz="3200" dirty="0">
+              <a:solidFill>
+                <a:schemeClr val="tx1"/>
+              </a:solidFill>
+            </a:endParaRPr>
           </a:p>
         </p:txBody>
       </p:sp>
@@ -3375,6 +3444,11 @@
           <a:prstGeom prst="rect">
             <a:avLst/>
           </a:prstGeom>
+          <a:solidFill>
+            <a:schemeClr val="accent6">
+              <a:lumMod val="50000"/>
+            </a:schemeClr>
+          </a:solidFill>
         </p:spPr>
         <p:style>
           <a:lnRef idx="2">
@@ -3400,57 +3474,6 @@
             <a:r>
               <a:rPr lang="en-US" sz="3200" dirty="0" smtClean="0"/>
               <a:t>Database</a:t>
-            </a:r>
-            <a:endParaRPr lang="en-US" sz="3200" dirty="0"/>
-          </a:p>
-        </p:txBody>
-      </p:sp>
-      <p:sp>
-        <p:nvSpPr>
-          <p:cNvPr id="19" name="Rectangle 18"/>
-          <p:cNvSpPr/>
-          <p:nvPr/>
-        </p:nvSpPr>
-        <p:spPr>
-          <a:xfrm>
-            <a:off x="6561513" y="5329151"/>
-            <a:ext cx="2441171" cy="1066801"/>
-          </a:xfrm>
-          <a:prstGeom prst="rect">
-            <a:avLst/>
-          </a:prstGeom>
-          <a:solidFill>
-            <a:srgbClr val="800000"/>
-          </a:solidFill>
-        </p:spPr>
-        <p:style>
-          <a:lnRef idx="2">
-            <a:schemeClr val="accent1">
-              <a:shade val="50000"/>
-            </a:schemeClr>
-          </a:lnRef>
-          <a:fillRef idx="1">
-            <a:schemeClr val="accent1"/>
-          </a:fillRef>
-          <a:effectRef idx="0">
-            <a:schemeClr val="accent1"/>
-          </a:effectRef>
-          <a:fontRef idx="minor">
-            <a:schemeClr val="lt1"/>
-          </a:fontRef>
-        </p:style>
-        <p:txBody>
-          <a:bodyPr rtlCol="0" anchor="ctr"/>
-          <a:lstStyle/>
-          <a:p>
-            <a:pPr algn="ctr"/>
-            <a:r>
-              <a:rPr lang="en-US" sz="3200" dirty="0" err="1" smtClean="0"/>
-              <a:t>Vicon</a:t>
-            </a:r>
-            <a:r>
-              <a:rPr lang="en-US" sz="3200" dirty="0" smtClean="0"/>
-              <a:t> Verification</a:t>
             </a:r>
             <a:endParaRPr lang="en-US" sz="3200" dirty="0"/>
           </a:p>
@@ -3918,7 +3941,7 @@
             <a:avLst/>
           </a:prstGeom>
           <a:solidFill>
-            <a:schemeClr val="accent1"/>
+            <a:srgbClr val="FFC000"/>
           </a:solidFill>
           <a:ln>
             <a:solidFill>
@@ -3966,10 +3989,7 @@
             <a:avLst/>
           </a:prstGeom>
           <a:solidFill>
-            <a:schemeClr val="tx1">
-              <a:lumMod val="50000"/>
-              <a:lumOff val="50000"/>
-            </a:schemeClr>
+            <a:srgbClr val="FF0000"/>
           </a:solidFill>
           <a:ln>
             <a:solidFill>
@@ -4007,102 +4027,6 @@
       </p:sp>
       <p:sp>
         <p:nvSpPr>
-          <p:cNvPr id="76" name="Rectangle 75"/>
-          <p:cNvSpPr/>
-          <p:nvPr/>
-        </p:nvSpPr>
-        <p:spPr>
-          <a:xfrm>
-            <a:off x="2958177" y="5363320"/>
-            <a:ext cx="288387" cy="292608"/>
-          </a:xfrm>
-          <a:prstGeom prst="rect">
-            <a:avLst/>
-          </a:prstGeom>
-          <a:solidFill>
-            <a:srgbClr val="800000"/>
-          </a:solidFill>
-          <a:ln>
-            <a:solidFill>
-              <a:srgbClr val="800000"/>
-            </a:solidFill>
-          </a:ln>
-        </p:spPr>
-        <p:style>
-          <a:lnRef idx="2">
-            <a:schemeClr val="accent1">
-              <a:shade val="50000"/>
-            </a:schemeClr>
-          </a:lnRef>
-          <a:fillRef idx="1">
-            <a:schemeClr val="accent1"/>
-          </a:fillRef>
-          <a:effectRef idx="0">
-            <a:schemeClr val="accent1"/>
-          </a:effectRef>
-          <a:fontRef idx="minor">
-            <a:schemeClr val="lt1"/>
-          </a:fontRef>
-        </p:style>
-        <p:txBody>
-          <a:bodyPr rtlCol="0" anchor="ctr"/>
-          <a:lstStyle/>
-          <a:p>
-            <a:pPr algn="ctr"/>
-            <a:endParaRPr lang="en-US"/>
-          </a:p>
-        </p:txBody>
-      </p:sp>
-      <p:sp>
-        <p:nvSpPr>
-          <p:cNvPr id="77" name="Rectangle 76"/>
-          <p:cNvSpPr/>
-          <p:nvPr/>
-        </p:nvSpPr>
-        <p:spPr>
-          <a:xfrm>
-            <a:off x="2958176" y="5973519"/>
-            <a:ext cx="288387" cy="292608"/>
-          </a:xfrm>
-          <a:prstGeom prst="rect">
-            <a:avLst/>
-          </a:prstGeom>
-          <a:solidFill>
-            <a:schemeClr val="tx1"/>
-          </a:solidFill>
-          <a:ln>
-            <a:solidFill>
-              <a:schemeClr val="tx1"/>
-            </a:solidFill>
-          </a:ln>
-        </p:spPr>
-        <p:style>
-          <a:lnRef idx="2">
-            <a:schemeClr val="accent1">
-              <a:shade val="50000"/>
-            </a:schemeClr>
-          </a:lnRef>
-          <a:fillRef idx="1">
-            <a:schemeClr val="accent1"/>
-          </a:fillRef>
-          <a:effectRef idx="0">
-            <a:schemeClr val="accent1"/>
-          </a:effectRef>
-          <a:fontRef idx="minor">
-            <a:schemeClr val="lt1"/>
-          </a:fontRef>
-        </p:style>
-        <p:txBody>
-          <a:bodyPr rtlCol="0" anchor="ctr"/>
-          <a:lstStyle/>
-          <a:p>
-            <a:pPr algn="ctr"/>
-            <a:endParaRPr lang="en-US"/>
-          </a:p>
-        </p:txBody>
-      </p:sp>
-      <p:sp>
-        <p:nvSpPr>
           <p:cNvPr id="79" name="TextBox 78"/>
           <p:cNvSpPr txBox="1"/>
           <p:nvPr/>
@@ -4110,7 +4034,7 @@
         <p:spPr>
           <a:xfrm>
             <a:off x="520872" y="5060153"/>
-            <a:ext cx="1826910" cy="461665"/>
+            <a:ext cx="1478803" cy="461665"/>
           </a:xfrm>
           <a:prstGeom prst="rect">
             <a:avLst/>
@@ -4125,7 +4049,7 @@
           <a:p>
             <a:r>
               <a:rPr lang="en-US" sz="2400" dirty="0" smtClean="0"/>
-              <a:t>Data Capture</a:t>
+              <a:t>Integrated</a:t>
             </a:r>
             <a:endParaRPr lang="en-US" sz="2400" dirty="0"/>
           </a:p>
@@ -4140,7 +4064,7 @@
         <p:spPr>
           <a:xfrm>
             <a:off x="522026" y="5641699"/>
-            <a:ext cx="2397644" cy="461665"/>
+            <a:ext cx="4175374" cy="461665"/>
           </a:xfrm>
           <a:prstGeom prst="rect">
             <a:avLst/>
@@ -4155,7 +4079,7 @@
           <a:p>
             <a:r>
               <a:rPr lang="en-US" sz="2400" dirty="0" smtClean="0"/>
-              <a:t>Computer System</a:t>
+              <a:t>Requires integration refinement</a:t>
             </a:r>
             <a:endParaRPr lang="en-US" sz="2400" dirty="0"/>
           </a:p>
@@ -4170,7 +4094,7 @@
         <p:spPr>
           <a:xfrm>
             <a:off x="520872" y="6239320"/>
-            <a:ext cx="2036198" cy="461665"/>
+            <a:ext cx="2464008" cy="461665"/>
           </a:xfrm>
           <a:prstGeom prst="rect">
             <a:avLst/>
@@ -4185,67 +4109,7 @@
           <a:p>
             <a:r>
               <a:rPr lang="en-US" sz="2400" dirty="0" smtClean="0"/>
-              <a:t>Display System</a:t>
-            </a:r>
-            <a:endParaRPr lang="en-US" sz="2400" dirty="0"/>
-          </a:p>
-        </p:txBody>
-      </p:sp>
-      <p:sp>
-        <p:nvSpPr>
-          <p:cNvPr id="82" name="TextBox 81"/>
-          <p:cNvSpPr txBox="1"/>
-          <p:nvPr/>
-        </p:nvSpPr>
-        <p:spPr>
-          <a:xfrm>
-            <a:off x="3270911" y="5271348"/>
-            <a:ext cx="1639167" cy="461665"/>
-          </a:xfrm>
-          <a:prstGeom prst="rect">
-            <a:avLst/>
-          </a:prstGeom>
-          <a:noFill/>
-        </p:spPr>
-        <p:txBody>
-          <a:bodyPr wrap="none" rtlCol="0">
-            <a:spAutoFit/>
-          </a:bodyPr>
-          <a:lstStyle/>
-          <a:p>
-            <a:r>
-              <a:rPr lang="en-US" sz="2400" dirty="0" smtClean="0"/>
-              <a:t>Test System</a:t>
-            </a:r>
-            <a:endParaRPr lang="en-US" sz="2400" dirty="0"/>
-          </a:p>
-        </p:txBody>
-      </p:sp>
-      <p:sp>
-        <p:nvSpPr>
-          <p:cNvPr id="83" name="TextBox 82"/>
-          <p:cNvSpPr txBox="1"/>
-          <p:nvPr/>
-        </p:nvSpPr>
-        <p:spPr>
-          <a:xfrm>
-            <a:off x="3205579" y="5888990"/>
-            <a:ext cx="2965877" cy="461665"/>
-          </a:xfrm>
-          <a:prstGeom prst="rect">
-            <a:avLst/>
-          </a:prstGeom>
-          <a:noFill/>
-        </p:spPr>
-        <p:txBody>
-          <a:bodyPr wrap="none" rtlCol="0">
-            <a:spAutoFit/>
-          </a:bodyPr>
-          <a:lstStyle/>
-          <a:p>
-            <a:r>
-              <a:rPr lang="en-US" sz="2400" dirty="0" smtClean="0"/>
-              <a:t>Digital Signal Interface</a:t>
+              <a:t>Not yet integrated</a:t>
             </a:r>
             <a:endParaRPr lang="en-US" sz="2400" dirty="0"/>
           </a:p>

</xml_diff>